<commit_message>
Put res and money options
</commit_message>
<xml_diff>
--- a/Make Mars Green Again(GGOM).pptx
+++ b/Make Mars Green Again(GGOM).pptx
@@ -108,6 +108,22 @@
       </a:defRPr>
     </a:lvl9pPr>
   </p:defaultTextStyle>
+  <p:extLst>
+    <p:ext uri="{EFAFB233-063F-42B5-8137-9DF3F51BA10A}">
+      <p15:sldGuideLst xmlns:p15="http://schemas.microsoft.com/office/powerpoint/2012/main">
+        <p15:guide id="1" orient="horz" pos="2160">
+          <p15:clr>
+            <a:srgbClr val="A4A3A4"/>
+          </p15:clr>
+        </p15:guide>
+        <p15:guide id="2" pos="2880">
+          <p15:clr>
+            <a:srgbClr val="A4A3A4"/>
+          </p15:clr>
+        </p15:guide>
+      </p15:sldGuideLst>
+    </p:ext>
+  </p:extLst>
 </p:presentation>
 </file>
 
@@ -3184,7 +3200,7 @@
           </a:lstStyle>
           <a:p>
             <a:r>
-              <a:rPr lang="en-US" smtClean="0"/>
+              <a:rPr lang="en-US"/>
               <a:t>Click to edit Master title style</a:t>
             </a:r>
             <a:endParaRPr lang="en-US" dirty="0"/>
@@ -3303,7 +3319,7 @@
           </a:lstStyle>
           <a:p>
             <a:r>
-              <a:rPr lang="en-US" smtClean="0"/>
+              <a:rPr lang="en-US"/>
               <a:t>Click to edit Master subtitle style</a:t>
             </a:r>
             <a:endParaRPr lang="en-US" dirty="0"/>
@@ -3351,10 +3367,9 @@
           <a:lstStyle/>
           <a:p>
             <a:r>
-              <a:rPr lang="en-US" smtClean="0"/>
+              <a:rPr lang="en-US"/>
               <a:t>Click to edit Master title style</a:t>
             </a:r>
-            <a:endParaRPr lang="en-US"/>
           </a:p>
         </p:txBody>
       </p:sp>
@@ -3375,38 +3390,37 @@
           <a:p>
             <a:pPr lvl="0"/>
             <a:r>
-              <a:rPr lang="en-US" smtClean="0"/>
+              <a:rPr lang="en-US"/>
               <a:t>Click to edit Master text styles</a:t>
             </a:r>
           </a:p>
           <a:p>
             <a:pPr lvl="1"/>
             <a:r>
-              <a:rPr lang="en-US" smtClean="0"/>
+              <a:rPr lang="en-US"/>
               <a:t>Second level</a:t>
             </a:r>
           </a:p>
           <a:p>
             <a:pPr lvl="2"/>
             <a:r>
-              <a:rPr lang="en-US" smtClean="0"/>
+              <a:rPr lang="en-US"/>
               <a:t>Third level</a:t>
             </a:r>
           </a:p>
           <a:p>
             <a:pPr lvl="3"/>
             <a:r>
-              <a:rPr lang="en-US" smtClean="0"/>
+              <a:rPr lang="en-US"/>
               <a:t>Fourth level</a:t>
             </a:r>
           </a:p>
           <a:p>
             <a:pPr lvl="4"/>
             <a:r>
-              <a:rPr lang="en-US" smtClean="0"/>
+              <a:rPr lang="en-US"/>
               <a:t>Fifth level</a:t>
             </a:r>
-            <a:endParaRPr lang="en-US"/>
           </a:p>
         </p:txBody>
       </p:sp>
@@ -3523,10 +3537,9 @@
           <a:lstStyle/>
           <a:p>
             <a:r>
-              <a:rPr lang="en-US" smtClean="0"/>
+              <a:rPr lang="en-US"/>
               <a:t>Click to edit Master title style</a:t>
             </a:r>
-            <a:endParaRPr lang="en-US"/>
           </a:p>
         </p:txBody>
       </p:sp>
@@ -3552,38 +3565,37 @@
           <a:p>
             <a:pPr lvl="0"/>
             <a:r>
-              <a:rPr lang="en-US" smtClean="0"/>
+              <a:rPr lang="en-US"/>
               <a:t>Click to edit Master text styles</a:t>
             </a:r>
           </a:p>
           <a:p>
             <a:pPr lvl="1"/>
             <a:r>
-              <a:rPr lang="en-US" smtClean="0"/>
+              <a:rPr lang="en-US"/>
               <a:t>Second level</a:t>
             </a:r>
           </a:p>
           <a:p>
             <a:pPr lvl="2"/>
             <a:r>
-              <a:rPr lang="en-US" smtClean="0"/>
+              <a:rPr lang="en-US"/>
               <a:t>Third level</a:t>
             </a:r>
           </a:p>
           <a:p>
             <a:pPr lvl="3"/>
             <a:r>
-              <a:rPr lang="en-US" smtClean="0"/>
+              <a:rPr lang="en-US"/>
               <a:t>Fourth level</a:t>
             </a:r>
           </a:p>
           <a:p>
             <a:pPr lvl="4"/>
             <a:r>
-              <a:rPr lang="en-US" smtClean="0"/>
+              <a:rPr lang="en-US"/>
               <a:t>Fifth level</a:t>
             </a:r>
-            <a:endParaRPr lang="en-US"/>
           </a:p>
         </p:txBody>
       </p:sp>
@@ -3695,7 +3707,7 @@
           <a:lstStyle/>
           <a:p>
             <a:r>
-              <a:rPr lang="en-US" smtClean="0"/>
+              <a:rPr lang="en-US"/>
               <a:t>Click to edit Master title style</a:t>
             </a:r>
             <a:endParaRPr lang="en-US" dirty="0"/>
@@ -3719,38 +3731,37 @@
           <a:p>
             <a:pPr lvl="0"/>
             <a:r>
-              <a:rPr lang="en-US" smtClean="0"/>
+              <a:rPr lang="en-US"/>
               <a:t>Click to edit Master text styles</a:t>
             </a:r>
           </a:p>
           <a:p>
             <a:pPr lvl="1"/>
             <a:r>
-              <a:rPr lang="en-US" smtClean="0"/>
+              <a:rPr lang="en-US"/>
               <a:t>Second level</a:t>
             </a:r>
           </a:p>
           <a:p>
             <a:pPr lvl="2"/>
             <a:r>
-              <a:rPr lang="en-US" smtClean="0"/>
+              <a:rPr lang="en-US"/>
               <a:t>Third level</a:t>
             </a:r>
           </a:p>
           <a:p>
             <a:pPr lvl="3"/>
             <a:r>
-              <a:rPr lang="en-US" smtClean="0"/>
+              <a:rPr lang="en-US"/>
               <a:t>Fourth level</a:t>
             </a:r>
           </a:p>
           <a:p>
             <a:pPr lvl="4"/>
             <a:r>
-              <a:rPr lang="en-US" smtClean="0"/>
+              <a:rPr lang="en-US"/>
               <a:t>Fifth level</a:t>
             </a:r>
-            <a:endParaRPr lang="en-US"/>
           </a:p>
         </p:txBody>
       </p:sp>
@@ -6846,7 +6857,7 @@
           <a:p>
             <a:pPr lvl="0"/>
             <a:r>
-              <a:rPr lang="en-US" smtClean="0"/>
+              <a:rPr lang="en-US"/>
               <a:t>Click to edit Master text styles</a:t>
             </a:r>
           </a:p>
@@ -6873,10 +6884,9 @@
           <a:lstStyle/>
           <a:p>
             <a:r>
-              <a:rPr lang="en-US" smtClean="0"/>
+              <a:rPr lang="en-US"/>
               <a:t>Click to edit Master title style</a:t>
             </a:r>
-            <a:endParaRPr lang="en-US"/>
           </a:p>
         </p:txBody>
       </p:sp>
@@ -6988,10 +6998,9 @@
           <a:lstStyle/>
           <a:p>
             <a:r>
-              <a:rPr lang="en-US" smtClean="0"/>
+              <a:rPr lang="en-US"/>
               <a:t>Click to edit Master title style</a:t>
             </a:r>
-            <a:endParaRPr lang="en-US"/>
           </a:p>
         </p:txBody>
       </p:sp>
@@ -7045,38 +7054,37 @@
           <a:p>
             <a:pPr lvl="0"/>
             <a:r>
-              <a:rPr lang="en-US" smtClean="0"/>
+              <a:rPr lang="en-US"/>
               <a:t>Click to edit Master text styles</a:t>
             </a:r>
           </a:p>
           <a:p>
             <a:pPr lvl="1"/>
             <a:r>
-              <a:rPr lang="en-US" smtClean="0"/>
+              <a:rPr lang="en-US"/>
               <a:t>Second level</a:t>
             </a:r>
           </a:p>
           <a:p>
             <a:pPr lvl="2"/>
             <a:r>
-              <a:rPr lang="en-US" smtClean="0"/>
+              <a:rPr lang="en-US"/>
               <a:t>Third level</a:t>
             </a:r>
           </a:p>
           <a:p>
             <a:pPr lvl="3"/>
             <a:r>
-              <a:rPr lang="en-US" smtClean="0"/>
+              <a:rPr lang="en-US"/>
               <a:t>Fourth level</a:t>
             </a:r>
           </a:p>
           <a:p>
             <a:pPr lvl="4"/>
             <a:r>
-              <a:rPr lang="en-US" smtClean="0"/>
+              <a:rPr lang="en-US"/>
               <a:t>Fifth level</a:t>
             </a:r>
-            <a:endParaRPr lang="en-US"/>
           </a:p>
         </p:txBody>
       </p:sp>
@@ -7130,38 +7138,37 @@
           <a:p>
             <a:pPr lvl="0"/>
             <a:r>
-              <a:rPr lang="en-US" smtClean="0"/>
+              <a:rPr lang="en-US"/>
               <a:t>Click to edit Master text styles</a:t>
             </a:r>
           </a:p>
           <a:p>
             <a:pPr lvl="1"/>
             <a:r>
-              <a:rPr lang="en-US" smtClean="0"/>
+              <a:rPr lang="en-US"/>
               <a:t>Second level</a:t>
             </a:r>
           </a:p>
           <a:p>
             <a:pPr lvl="2"/>
             <a:r>
-              <a:rPr lang="en-US" smtClean="0"/>
+              <a:rPr lang="en-US"/>
               <a:t>Third level</a:t>
             </a:r>
           </a:p>
           <a:p>
             <a:pPr lvl="3"/>
             <a:r>
-              <a:rPr lang="en-US" smtClean="0"/>
+              <a:rPr lang="en-US"/>
               <a:t>Fourth level</a:t>
             </a:r>
           </a:p>
           <a:p>
             <a:pPr lvl="4"/>
             <a:r>
-              <a:rPr lang="en-US" smtClean="0"/>
+              <a:rPr lang="en-US"/>
               <a:t>Fifth level</a:t>
             </a:r>
-            <a:endParaRPr lang="en-US"/>
           </a:p>
         </p:txBody>
       </p:sp>
@@ -7277,10 +7284,9 @@
           </a:lstStyle>
           <a:p>
             <a:r>
-              <a:rPr lang="en-US" smtClean="0"/>
+              <a:rPr lang="en-US"/>
               <a:t>Click to edit Master title style</a:t>
             </a:r>
-            <a:endParaRPr lang="en-US"/>
           </a:p>
         </p:txBody>
       </p:sp>
@@ -7343,7 +7349,7 @@
           <a:p>
             <a:pPr lvl="0"/>
             <a:r>
-              <a:rPr lang="en-US" smtClean="0"/>
+              <a:rPr lang="en-US"/>
               <a:t>Click to edit Master text styles</a:t>
             </a:r>
           </a:p>
@@ -7399,38 +7405,37 @@
           <a:p>
             <a:pPr lvl="0"/>
             <a:r>
-              <a:rPr lang="en-US" smtClean="0"/>
+              <a:rPr lang="en-US"/>
               <a:t>Click to edit Master text styles</a:t>
             </a:r>
           </a:p>
           <a:p>
             <a:pPr lvl="1"/>
             <a:r>
-              <a:rPr lang="en-US" smtClean="0"/>
+              <a:rPr lang="en-US"/>
               <a:t>Second level</a:t>
             </a:r>
           </a:p>
           <a:p>
             <a:pPr lvl="2"/>
             <a:r>
-              <a:rPr lang="en-US" smtClean="0"/>
+              <a:rPr lang="en-US"/>
               <a:t>Third level</a:t>
             </a:r>
           </a:p>
           <a:p>
             <a:pPr lvl="3"/>
             <a:r>
-              <a:rPr lang="en-US" smtClean="0"/>
+              <a:rPr lang="en-US"/>
               <a:t>Fourth level</a:t>
             </a:r>
           </a:p>
           <a:p>
             <a:pPr lvl="4"/>
             <a:r>
-              <a:rPr lang="en-US" smtClean="0"/>
+              <a:rPr lang="en-US"/>
               <a:t>Fifth level</a:t>
             </a:r>
-            <a:endParaRPr lang="en-US"/>
           </a:p>
         </p:txBody>
       </p:sp>
@@ -7493,7 +7498,7 @@
           <a:p>
             <a:pPr lvl="0"/>
             <a:r>
-              <a:rPr lang="en-US" smtClean="0"/>
+              <a:rPr lang="en-US"/>
               <a:t>Click to edit Master text styles</a:t>
             </a:r>
           </a:p>
@@ -7549,38 +7554,37 @@
           <a:p>
             <a:pPr lvl="0"/>
             <a:r>
-              <a:rPr lang="en-US" smtClean="0"/>
+              <a:rPr lang="en-US"/>
               <a:t>Click to edit Master text styles</a:t>
             </a:r>
           </a:p>
           <a:p>
             <a:pPr lvl="1"/>
             <a:r>
-              <a:rPr lang="en-US" smtClean="0"/>
+              <a:rPr lang="en-US"/>
               <a:t>Second level</a:t>
             </a:r>
           </a:p>
           <a:p>
             <a:pPr lvl="2"/>
             <a:r>
-              <a:rPr lang="en-US" smtClean="0"/>
+              <a:rPr lang="en-US"/>
               <a:t>Third level</a:t>
             </a:r>
           </a:p>
           <a:p>
             <a:pPr lvl="3"/>
             <a:r>
-              <a:rPr lang="en-US" smtClean="0"/>
+              <a:rPr lang="en-US"/>
               <a:t>Fourth level</a:t>
             </a:r>
           </a:p>
           <a:p>
             <a:pPr lvl="4"/>
             <a:r>
-              <a:rPr lang="en-US" smtClean="0"/>
+              <a:rPr lang="en-US"/>
               <a:t>Fifth level</a:t>
             </a:r>
-            <a:endParaRPr lang="en-US"/>
           </a:p>
         </p:txBody>
       </p:sp>
@@ -7692,10 +7696,9 @@
           <a:lstStyle/>
           <a:p>
             <a:r>
-              <a:rPr lang="en-US" smtClean="0"/>
+              <a:rPr lang="en-US"/>
               <a:t>Click to edit Master title style</a:t>
             </a:r>
-            <a:endParaRPr lang="en-US"/>
           </a:p>
         </p:txBody>
       </p:sp>
@@ -7933,35 +7936,35 @@
           <a:p>
             <a:pPr lvl="0"/>
             <a:r>
-              <a:rPr lang="en-US" smtClean="0"/>
+              <a:rPr lang="en-US"/>
               <a:t>Click to edit Master text styles</a:t>
             </a:r>
           </a:p>
           <a:p>
             <a:pPr lvl="1"/>
             <a:r>
-              <a:rPr lang="en-US" smtClean="0"/>
+              <a:rPr lang="en-US"/>
               <a:t>Second level</a:t>
             </a:r>
           </a:p>
           <a:p>
             <a:pPr lvl="2"/>
             <a:r>
-              <a:rPr lang="en-US" smtClean="0"/>
+              <a:rPr lang="en-US"/>
               <a:t>Third level</a:t>
             </a:r>
           </a:p>
           <a:p>
             <a:pPr lvl="3"/>
             <a:r>
-              <a:rPr lang="en-US" smtClean="0"/>
+              <a:rPr lang="en-US"/>
               <a:t>Fourth level</a:t>
             </a:r>
           </a:p>
           <a:p>
             <a:pPr lvl="4"/>
             <a:r>
-              <a:rPr lang="en-US" smtClean="0"/>
+              <a:rPr lang="en-US"/>
               <a:t>Fifth level</a:t>
             </a:r>
             <a:endParaRPr lang="en-US" dirty="0"/>
@@ -8260,7 +8263,7 @@
           </a:lstStyle>
           <a:p>
             <a:r>
-              <a:rPr lang="en-US" smtClean="0"/>
+              <a:rPr lang="en-US"/>
               <a:t>Click to edit Master title style</a:t>
             </a:r>
             <a:endParaRPr lang="en-US" dirty="0"/>
@@ -8332,7 +8335,7 @@
           <a:p>
             <a:pPr lvl="0"/>
             <a:r>
-              <a:rPr lang="en-US" smtClean="0"/>
+              <a:rPr lang="en-US"/>
               <a:t>Click to edit Master text styles</a:t>
             </a:r>
           </a:p>
@@ -8449,10 +8452,9 @@
           </a:lstStyle>
           <a:p>
             <a:r>
-              <a:rPr lang="en-US" smtClean="0"/>
+              <a:rPr lang="en-US"/>
               <a:t>Click icon to add picture</a:t>
             </a:r>
-            <a:endParaRPr lang="en-US"/>
           </a:p>
         </p:txBody>
       </p:sp>
@@ -8738,7 +8740,7 @@
           </a:lstStyle>
           <a:p>
             <a:r>
-              <a:rPr lang="en-US" smtClean="0"/>
+              <a:rPr lang="en-US"/>
               <a:t>Click to edit Master title style</a:t>
             </a:r>
             <a:endParaRPr lang="en-US" dirty="0"/>
@@ -8810,7 +8812,7 @@
           <a:p>
             <a:pPr lvl="0"/>
             <a:r>
-              <a:rPr lang="en-US" smtClean="0"/>
+              <a:rPr lang="en-US"/>
               <a:t>Click to edit Master text styles</a:t>
             </a:r>
           </a:p>
@@ -8925,7 +8927,7 @@
           <a:lstStyle/>
           <a:p>
             <a:r>
-              <a:rPr lang="en-US" smtClean="0"/>
+              <a:rPr lang="en-US"/>
               <a:t>Click to edit Master title style</a:t>
             </a:r>
             <a:endParaRPr lang="en-US" dirty="0"/>
@@ -8959,35 +8961,35 @@
           <a:p>
             <a:pPr lvl="0"/>
             <a:r>
-              <a:rPr lang="en-US" smtClean="0"/>
+              <a:rPr lang="en-US"/>
               <a:t>Click to edit Master text styles</a:t>
             </a:r>
           </a:p>
           <a:p>
             <a:pPr lvl="1"/>
             <a:r>
-              <a:rPr lang="en-US" smtClean="0"/>
+              <a:rPr lang="en-US"/>
               <a:t>Second level</a:t>
             </a:r>
           </a:p>
           <a:p>
             <a:pPr lvl="2"/>
             <a:r>
-              <a:rPr lang="en-US" smtClean="0"/>
+              <a:rPr lang="en-US"/>
               <a:t>Third level</a:t>
             </a:r>
           </a:p>
           <a:p>
             <a:pPr lvl="3"/>
             <a:r>
-              <a:rPr lang="en-US" smtClean="0"/>
+              <a:rPr lang="en-US"/>
               <a:t>Fourth level</a:t>
             </a:r>
           </a:p>
           <a:p>
             <a:pPr lvl="4"/>
             <a:r>
-              <a:rPr lang="en-US" smtClean="0"/>
+              <a:rPr lang="en-US"/>
               <a:t>Fifth level</a:t>
             </a:r>
             <a:endParaRPr lang="en-US" dirty="0"/>
@@ -9458,10 +9460,9 @@
           <a:lstStyle/>
           <a:p>
             <a:r>
-              <a:rPr lang="en-US" dirty="0" smtClean="0"/>
+              <a:rPr lang="en-US" dirty="0"/>
               <a:t>Make Mars Green Again(GGOM)</a:t>
             </a:r>
-            <a:endParaRPr lang="en-US" dirty="0"/>
           </a:p>
         </p:txBody>
       </p:sp>
@@ -9481,11 +9482,11 @@
           <a:lstStyle/>
           <a:p>
             <a:r>
-              <a:rPr lang="en-US" dirty="0" smtClean="0"/>
+              <a:rPr lang="en-US" dirty="0"/>
               <a:t>Team Deep </a:t>
             </a:r>
             <a:r>
-              <a:rPr lang="en-US" dirty="0" err="1" smtClean="0"/>
+              <a:rPr lang="en-US" dirty="0" err="1"/>
               <a:t>Bluu</a:t>
             </a:r>
             <a:endParaRPr lang="en-US" dirty="0"/>
@@ -9495,7 +9496,7 @@
     </p:spTree>
     <p:extLst>
       <p:ext uri="{BB962C8B-B14F-4D97-AF65-F5344CB8AC3E}">
-        <p14:creationId xmlns:p14="http://schemas.microsoft.com/office/powerpoint/2010/main" xmlns="" val="320771992"/>
+        <p14:creationId xmlns:p14="http://schemas.microsoft.com/office/powerpoint/2010/main" val="320771992"/>
       </p:ext>
     </p:extLst>
   </p:cSld>
@@ -9539,10 +9540,9 @@
           <a:p>
             <a:pPr algn="ctr"/>
             <a:r>
-              <a:rPr lang="en-US" dirty="0" smtClean="0"/>
+              <a:rPr lang="en-US" dirty="0"/>
               <a:t>Purpose</a:t>
             </a:r>
-            <a:endParaRPr lang="en-US" dirty="0"/>
           </a:p>
         </p:txBody>
       </p:sp>
@@ -9567,22 +9567,14 @@
           <a:lstStyle/>
           <a:p>
             <a:r>
-              <a:rPr lang="en-US" dirty="0" smtClean="0"/>
+              <a:rPr lang="en-US" dirty="0"/>
               <a:t>Show a more green future on our dear neighbor Mars</a:t>
             </a:r>
           </a:p>
           <a:p>
             <a:r>
-              <a:rPr lang="en-US" dirty="0" smtClean="0"/>
-              <a:t>The game is supposed to be a fun and educational, to teach people about plant </a:t>
-            </a:r>
-            <a:r>
-              <a:rPr lang="en-US" dirty="0" smtClean="0"/>
-              <a:t>life in unnatural environment </a:t>
-            </a:r>
-            <a:r>
-              <a:rPr lang="en-US" dirty="0" smtClean="0"/>
-              <a:t>in an unique and fun way</a:t>
+              <a:rPr lang="en-US" dirty="0"/>
+              <a:t>The game is supposed to be a fun and educational, to teach people about plant life in unnatural environment in an unique and fun way</a:t>
             </a:r>
           </a:p>
         </p:txBody>
@@ -9590,7 +9582,7 @@
     </p:spTree>
     <p:extLst>
       <p:ext uri="{BB962C8B-B14F-4D97-AF65-F5344CB8AC3E}">
-        <p14:creationId xmlns:p14="http://schemas.microsoft.com/office/powerpoint/2010/main" xmlns="" val="1903285699"/>
+        <p14:creationId xmlns:p14="http://schemas.microsoft.com/office/powerpoint/2010/main" val="1903285699"/>
       </p:ext>
     </p:extLst>
   </p:cSld>
@@ -9684,7 +9676,7 @@
           <a:noFill/>
           <a:extLst>
             <a:ext uri="{909E8E84-426E-40DD-AFC4-6F175D3DCCD1}">
-              <a14:hiddenFill xmlns:a14="http://schemas.microsoft.com/office/drawing/2010/main" xmlns="">
+              <a14:hiddenFill xmlns:a14="http://schemas.microsoft.com/office/drawing/2010/main">
                 <a:solidFill>
                   <a:srgbClr val="FFFFFF"/>
                 </a:solidFill>
@@ -9723,7 +9715,7 @@
           <a:noFill/>
           <a:extLst>
             <a:ext uri="{909E8E84-426E-40DD-AFC4-6F175D3DCCD1}">
-              <a14:hiddenFill xmlns:a14="http://schemas.microsoft.com/office/drawing/2010/main" xmlns="">
+              <a14:hiddenFill xmlns:a14="http://schemas.microsoft.com/office/drawing/2010/main">
                 <a:solidFill>
                   <a:srgbClr val="FFFFFF"/>
                 </a:solidFill>
@@ -9755,7 +9747,7 @@
           <a:blip r:embed="rId2">
             <a:extLst>
               <a:ext uri="{28A0092B-C50C-407E-A947-70E740481C1C}">
-                <a14:useLocalDpi xmlns:a14="http://schemas.microsoft.com/office/drawing/2010/main" xmlns="" val="0"/>
+                <a14:useLocalDpi xmlns:a14="http://schemas.microsoft.com/office/drawing/2010/main" val="0"/>
               </a:ext>
             </a:extLst>
           </a:blip>
@@ -9779,14 +9771,14 @@
           <a:effectLst/>
           <a:extLst>
             <a:ext uri="{909E8E84-426E-40DD-AFC4-6F175D3DCCD1}">
-              <a14:hiddenFill xmlns:a14="http://schemas.microsoft.com/office/drawing/2010/main" xmlns="">
+              <a14:hiddenFill xmlns:a14="http://schemas.microsoft.com/office/drawing/2010/main">
                 <a:solidFill>
                   <a:schemeClr val="accent1"/>
                 </a:solidFill>
               </a14:hiddenFill>
             </a:ext>
             <a:ext uri="{91240B29-F687-4F45-9708-019B960494DF}">
-              <a14:hiddenLine xmlns:a14="http://schemas.microsoft.com/office/drawing/2010/main" xmlns="" w="9525">
+              <a14:hiddenLine xmlns:a14="http://schemas.microsoft.com/office/drawing/2010/main" w="9525">
                 <a:solidFill>
                   <a:schemeClr val="tx1"/>
                 </a:solidFill>
@@ -9796,7 +9788,7 @@
               </a14:hiddenLine>
             </a:ext>
             <a:ext uri="{AF507438-7753-43E0-B8FC-AC1667EBCBE1}">
-              <a14:hiddenEffects xmlns:a14="http://schemas.microsoft.com/office/drawing/2010/main" xmlns="">
+              <a14:hiddenEffects xmlns:a14="http://schemas.microsoft.com/office/drawing/2010/main">
                 <a:effectLst>
                   <a:outerShdw dist="35921" dir="2700000" algn="ctr" rotWithShape="0">
                     <a:schemeClr val="bg2"/>
@@ -9810,7 +9802,7 @@
     </p:spTree>
     <p:extLst>
       <p:ext uri="{BB962C8B-B14F-4D97-AF65-F5344CB8AC3E}">
-        <p14:creationId xmlns:p14="http://schemas.microsoft.com/office/powerpoint/2010/main" xmlns="" val="3691981903"/>
+        <p14:creationId xmlns:p14="http://schemas.microsoft.com/office/powerpoint/2010/main" val="3691981903"/>
       </p:ext>
     </p:extLst>
   </p:cSld>
@@ -9853,10 +9845,9 @@
           <a:lstStyle/>
           <a:p>
             <a:r>
-              <a:rPr lang="en-US" dirty="0" smtClean="0"/>
+              <a:rPr lang="en-US" dirty="0"/>
               <a:t>Our plans for the future</a:t>
             </a:r>
-            <a:endParaRPr lang="en-US" dirty="0"/>
           </a:p>
         </p:txBody>
       </p:sp>
@@ -9876,51 +9867,46 @@
           <a:lstStyle/>
           <a:p>
             <a:r>
-              <a:rPr lang="en-US" dirty="0" smtClean="0"/>
+              <a:rPr lang="en-US" dirty="0"/>
               <a:t>Add more flora</a:t>
             </a:r>
           </a:p>
           <a:p>
             <a:r>
-              <a:rPr lang="en-US" dirty="0" smtClean="0"/>
+              <a:rPr lang="en-US" dirty="0"/>
               <a:t>Add more educational parts</a:t>
             </a:r>
           </a:p>
           <a:p>
             <a:r>
-              <a:rPr lang="en-US" dirty="0" smtClean="0"/>
+              <a:rPr lang="en-US" dirty="0"/>
               <a:t>Add descriptions and facts about every plan</a:t>
             </a:r>
           </a:p>
           <a:p>
             <a:r>
-              <a:rPr lang="en-US" dirty="0" smtClean="0"/>
+              <a:rPr lang="en-US" dirty="0"/>
               <a:t>Add realism</a:t>
             </a:r>
           </a:p>
           <a:p>
             <a:r>
-              <a:rPr lang="en-US" dirty="0" smtClean="0"/>
+              <a:rPr lang="en-US" dirty="0"/>
               <a:t>More planets</a:t>
             </a:r>
           </a:p>
           <a:p>
             <a:r>
-              <a:rPr lang="en-US" dirty="0" smtClean="0"/>
-              <a:t>Enable </a:t>
+              <a:rPr lang="en-US" dirty="0"/>
+              <a:t>Enable trading </a:t>
             </a:r>
-            <a:r>
-              <a:rPr lang="en-US" dirty="0" smtClean="0"/>
-              <a:t>trading </a:t>
-            </a:r>
-            <a:endParaRPr lang="en-US" dirty="0"/>
           </a:p>
         </p:txBody>
       </p:sp>
     </p:spTree>
     <p:extLst>
       <p:ext uri="{BB962C8B-B14F-4D97-AF65-F5344CB8AC3E}">
-        <p14:creationId xmlns:p14="http://schemas.microsoft.com/office/powerpoint/2010/main" xmlns="" val="2893946853"/>
+        <p14:creationId xmlns:p14="http://schemas.microsoft.com/office/powerpoint/2010/main" val="2893946853"/>
       </p:ext>
     </p:extLst>
   </p:cSld>
@@ -9963,10 +9949,9 @@
           <a:lstStyle/>
           <a:p>
             <a:r>
-              <a:rPr lang="en-US" dirty="0" smtClean="0"/>
+              <a:rPr lang="en-US" dirty="0"/>
               <a:t>What have we accomplished?</a:t>
             </a:r>
-            <a:endParaRPr lang="en-US" dirty="0"/>
           </a:p>
         </p:txBody>
       </p:sp>
@@ -9991,28 +9976,23 @@
           <a:lstStyle/>
           <a:p>
             <a:r>
-              <a:rPr lang="en-US" dirty="0" smtClean="0"/>
+              <a:rPr lang="en-US" dirty="0"/>
               <a:t>A cookie clicker</a:t>
             </a:r>
           </a:p>
           <a:p>
             <a:r>
-              <a:rPr lang="en-US" dirty="0" smtClean="0"/>
-              <a:t>And </a:t>
+              <a:rPr lang="en-US" dirty="0"/>
+              <a:t>And a cactus</a:t>
             </a:r>
             <a:r>
-              <a:rPr lang="en-US" dirty="0" smtClean="0"/>
-              <a:t>a cactus</a:t>
-            </a:r>
-            <a:r>
-              <a:rPr lang="bg-BG" dirty="0" smtClean="0"/>
+              <a:rPr lang="bg-BG" dirty="0"/>
               <a:t> </a:t>
             </a:r>
             <a:r>
-              <a:rPr lang="en-US" dirty="0" smtClean="0"/>
+              <a:rPr lang="en-US" dirty="0"/>
               <a:t>:</a:t>
             </a:r>
-            <a:endParaRPr lang="en-US" dirty="0"/>
           </a:p>
         </p:txBody>
       </p:sp>
@@ -10043,7 +10023,7 @@
     </p:spTree>
     <p:extLst>
       <p:ext uri="{BB962C8B-B14F-4D97-AF65-F5344CB8AC3E}">
-        <p14:creationId xmlns:p14="http://schemas.microsoft.com/office/powerpoint/2010/main" xmlns="" val="576409104"/>
+        <p14:creationId xmlns:p14="http://schemas.microsoft.com/office/powerpoint/2010/main" val="576409104"/>
       </p:ext>
     </p:extLst>
   </p:cSld>

</xml_diff>